<commit_message>
added data recorder documentation
</commit_message>
<xml_diff>
--- a/doc/agent-development.pptx
+++ b/doc/agent-development.pptx
@@ -3424,10 +3424,6 @@
               <a:rPr lang="en-US" smtClean="0"/>
               <a:t>Stick &amp; Throttle Control</a:t>
             </a:r>
-            <a:r>
-              <a:rPr lang="en-US" smtClean="0"/>
-              <a:t/>
-            </a:r>
             <a:br>
               <a:rPr lang="en-US" smtClean="0"/>
             </a:br>
@@ -3956,11 +3952,7 @@
           <a:p>
             <a:r>
               <a:rPr lang="en-US" sz="2400" smtClean="0"/>
-              <a:t>Default: requires </a:t>
-            </a:r>
-            <a:r>
-              <a:rPr lang="en-US" sz="2400" smtClean="0"/>
-              <a:t>a DynamicsModel to do anything meaningful</a:t>
+              <a:t>Default: requires a DynamicsModel to do anything meaningful</a:t>
             </a:r>
           </a:p>
           <a:p>
@@ -5568,11 +5560,7 @@
           <a:p>
             <a:r>
               <a:rPr lang="en-US" smtClean="0"/>
-              <a:t>Player </a:t>
-            </a:r>
-            <a:r>
-              <a:rPr lang="en-US" smtClean="0"/>
-              <a:t>FCS / Autopilot Interface</a:t>
+              <a:t>Player FCS / Autopilot Interface</a:t>
             </a:r>
             <a:endParaRPr lang="en-US" dirty="0"/>
           </a:p>
@@ -5599,11 +5587,7 @@
             </a:r>
             <a:r>
               <a:rPr lang="en-US" smtClean="0"/>
-              <a:t>to </a:t>
-            </a:r>
-            <a:r>
-              <a:rPr lang="en-US" smtClean="0"/>
-              <a:t>FCS / Autopilot </a:t>
+              <a:t>to FCS / Autopilot </a:t>
             </a:r>
             <a:r>
               <a:rPr lang="en-US" dirty="0" smtClean="0"/>
@@ -7162,11 +7146,7 @@
             </a:r>
             <a:r>
               <a:rPr lang="en-US" sz="2000" smtClean="0"/>
-              <a:t>the </a:t>
-            </a:r>
-            <a:r>
-              <a:rPr lang="en-US" sz="2000" smtClean="0"/>
-              <a:t>FCS/Autopilot by providing higher level features (e.g., Flight </a:t>
+              <a:t>the FCS/Autopilot by providing higher level features (e.g., Flight </a:t>
             </a:r>
             <a:r>
               <a:rPr lang="en-US" sz="2000" dirty="0" smtClean="0"/>
@@ -7190,11 +7170,7 @@
             </a:r>
             <a:r>
               <a:rPr lang="en-US" sz="2000" smtClean="0"/>
-              <a:t>make </a:t>
-            </a:r>
-            <a:r>
-              <a:rPr lang="en-US" sz="2000" smtClean="0"/>
-              <a:t>“decisions”</a:t>
+              <a:t>make “decisions”</a:t>
             </a:r>
             <a:endParaRPr lang="en-US" sz="2000" dirty="0" smtClean="0"/>
           </a:p>
@@ -7672,11 +7648,7 @@
           <a:p>
             <a:r>
               <a:rPr lang="en-US" smtClean="0"/>
-              <a:t>Player </a:t>
-            </a:r>
-            <a:r>
-              <a:rPr lang="en-US" smtClean="0"/>
-              <a:t>Structures</a:t>
+              <a:t>Player Structures</a:t>
             </a:r>
             <a:endParaRPr lang="en-US"/>
           </a:p>
@@ -7960,11 +7932,7 @@
               <a:pPr algn="ctr"/>
               <a:r>
                 <a:rPr lang="en-US" sz="1400" b="1" smtClean="0"/>
-                <a:t>Combination: Subclass </a:t>
-              </a:r>
-              <a:r>
-                <a:rPr lang="en-US" sz="1400" b="1" smtClean="0"/>
-                <a:t>and Composite</a:t>
+                <a:t>Combination: Subclass and Composite</a:t>
               </a:r>
               <a:endParaRPr lang="en-US" sz="1400" b="1"/>
             </a:p>
@@ -8651,11 +8619,7 @@
             </a:r>
             <a:r>
               <a:rPr lang="en-US" sz="2000" smtClean="0"/>
-              <a:t>to </a:t>
-            </a:r>
-            <a:r>
-              <a:rPr lang="en-US" sz="2000" smtClean="0"/>
-              <a:t>“FCS / Autopilot” </a:t>
+              <a:t>to “FCS / Autopilot” </a:t>
             </a:r>
             <a:r>
               <a:rPr lang="en-US" sz="2000" dirty="0" smtClean="0"/>
@@ -8663,11 +8627,7 @@
             </a:r>
             <a:r>
               <a:rPr lang="en-US" sz="2000" smtClean="0"/>
-              <a:t>even </a:t>
-            </a:r>
-            <a:r>
-              <a:rPr lang="en-US" sz="2000" smtClean="0"/>
-              <a:t>through direct </a:t>
+              <a:t>even through direct </a:t>
             </a:r>
             <a:r>
               <a:rPr lang="en-US" sz="2000" dirty="0" smtClean="0"/>
@@ -8821,15 +8781,7 @@
             </a:br>
             <a:r>
               <a:rPr lang="en-US" sz="2400" smtClean="0"/>
-              <a:t>(</a:t>
-            </a:r>
-            <a:r>
-              <a:rPr lang="en-US" sz="2400" smtClean="0"/>
-              <a:t>Implementations</a:t>
-            </a:r>
-            <a:r>
-              <a:rPr lang="en-US" sz="2400" smtClean="0"/>
-              <a:t>)</a:t>
+              <a:t>(Implementations)</a:t>
             </a:r>
             <a:endParaRPr lang="en-US" sz="4400"/>
           </a:p>
@@ -8917,11 +8869,7 @@
           <a:p>
             <a:r>
               <a:rPr lang="en-US" smtClean="0"/>
-              <a:t>Pilot </a:t>
-            </a:r>
-            <a:r>
-              <a:rPr lang="en-US" smtClean="0"/>
-              <a:t>Structures</a:t>
+              <a:t>Pilot Structures</a:t>
             </a:r>
             <a:endParaRPr lang="en-US"/>
           </a:p>
@@ -8965,11 +8913,7 @@
             <a:pPr lvl="1"/>
             <a:r>
               <a:rPr lang="en-US" sz="2000" smtClean="0"/>
-              <a:t>Indirect interface to external software system (e.g., Soar, CLIPS, </a:t>
-            </a:r>
-            <a:r>
-              <a:rPr lang="en-US" sz="2000" smtClean="0"/>
-              <a:t>scripts, etc)</a:t>
+              <a:t>Indirect interface to external software system (e.g., Soar, CLIPS, scripts, etc)</a:t>
             </a:r>
             <a:endParaRPr lang="en-US" sz="1600" smtClean="0"/>
           </a:p>
@@ -9314,11 +9258,7 @@
           <a:p>
             <a:r>
               <a:rPr lang="en-US" sz="4000" smtClean="0"/>
-              <a:t>Composite </a:t>
-            </a:r>
-            <a:r>
-              <a:rPr lang="en-US" sz="4000" smtClean="0"/>
-              <a:t>Structure</a:t>
+              <a:t>Composite Structure</a:t>
             </a:r>
             <a:endParaRPr lang="en-US" sz="4000"/>
           </a:p>
@@ -11015,11 +10955,7 @@
             </a:r>
             <a:r>
               <a:rPr lang="en-US" sz="1600" smtClean="0"/>
-              <a:t>of </a:t>
-            </a:r>
-            <a:r>
-              <a:rPr lang="en-US" sz="1600" smtClean="0"/>
-              <a:t>FCS and Autopilot </a:t>
+              <a:t>of FCS and Autopilot </a:t>
             </a:r>
             <a:r>
               <a:rPr lang="en-US" sz="1600" dirty="0" smtClean="0"/>
@@ -11120,11 +11056,7 @@
             </a:r>
             <a:r>
               <a:rPr lang="en-US" smtClean="0"/>
-              <a:t>FMS </a:t>
-            </a:r>
-            <a:r>
-              <a:rPr lang="en-US" smtClean="0"/>
-              <a:t>Relationships</a:t>
+              <a:t>FMS Relationships</a:t>
             </a:r>
             <a:br>
               <a:rPr lang="en-US" smtClean="0"/>
@@ -11193,11 +11125,7 @@
             </a:r>
             <a:r>
               <a:rPr lang="en-US" sz="1800" smtClean="0"/>
-              <a:t>guide </a:t>
-            </a:r>
-            <a:r>
-              <a:rPr lang="en-US" sz="1800" smtClean="0"/>
-              <a:t>or </a:t>
+              <a:t>guide or </a:t>
             </a:r>
             <a:r>
               <a:rPr lang="en-US" sz="1800" b="1" i="1" u="sng" smtClean="0"/>
@@ -12642,24 +12570,7 @@
                 <a:ea typeface="+mj-ea"/>
                 <a:cs typeface="+mj-cs"/>
               </a:rPr>
-              <a:t> </a:t>
-            </a:r>
-            <a:r>
-              <a:rPr kumimoji="0" lang="en-US" sz="4400" b="0" i="0" u="none" strike="noStrike" kern="1200" cap="none" spc="0" normalizeH="0" noProof="0" smtClean="0">
-                <a:ln>
-                  <a:noFill/>
-                </a:ln>
-                <a:solidFill>
-                  <a:schemeClr val="tx1"/>
-                </a:solidFill>
-                <a:effectLst/>
-                <a:uLnTx/>
-                <a:uFillTx/>
-                <a:latin typeface="+mj-lt"/>
-                <a:ea typeface="+mj-ea"/>
-                <a:cs typeface="+mj-cs"/>
-              </a:rPr>
-              <a:t>Dynamics</a:t>
+              <a:t> Dynamics</a:t>
             </a:r>
             <a:endParaRPr kumimoji="0" lang="en-US" sz="4400" b="0" i="0" u="none" strike="noStrike" kern="1200" cap="none" spc="0" normalizeH="0" baseline="0" noProof="0" dirty="0">
               <a:ln>

</xml_diff>